<commit_message>
Inital Thoughts on Data in the Presentation
</commit_message>
<xml_diff>
--- a/Resources/Project 1 Presentation.pptx
+++ b/Resources/Project 1 Presentation.pptx
@@ -2,7 +2,7 @@
 <file path=ppt/presentation.xml><?xml version="1.0" encoding="utf-8"?>
 <p:presentation xmlns:a="http://schemas.openxmlformats.org/drawingml/2006/main" xmlns:r="http://schemas.openxmlformats.org/officeDocument/2006/relationships" xmlns:p="http://schemas.openxmlformats.org/presentationml/2006/main" saveSubsetFonts="1">
   <p:sldMasterIdLst>
-    <p:sldMasterId id="2147483648" r:id="rId1"/>
+    <p:sldMasterId id="2147483750" r:id="rId1"/>
   </p:sldMasterIdLst>
   <p:sldIdLst>
     <p:sldId id="256" r:id="rId2"/>
@@ -113,6 +113,11 @@
       </a:defRPr>
     </a:lvl9pPr>
   </p:defaultTextStyle>
+  <p:extLst>
+    <p:ext uri="{EFAFB233-063F-42B5-8137-9DF3F51BA10A}">
+      <p15:sldGuideLst xmlns:p15="http://schemas.microsoft.com/office/powerpoint/2012/main"/>
+    </p:ext>
+  </p:extLst>
 </p:presentation>
 </file>
 
@@ -138,7 +143,7 @@
           <p:cNvPr id="2" name="Title 1">
             <a:extLst>
               <a:ext uri="{FF2B5EF4-FFF2-40B4-BE49-F238E27FC236}">
-                <a16:creationId xmlns:a16="http://schemas.microsoft.com/office/drawing/2014/main" id="{FED5C909-68DC-4FAC-8F53-513360152354}"/>
+                <a16:creationId xmlns:a16="http://schemas.microsoft.com/office/drawing/2014/main" id="{BD315EA0-53CF-408E-B44A-CD75707EEAEE}"/>
               </a:ext>
             </a:extLst>
           </p:cNvPr>
@@ -175,7 +180,7 @@
           <p:cNvPr id="3" name="Subtitle 2">
             <a:extLst>
               <a:ext uri="{FF2B5EF4-FFF2-40B4-BE49-F238E27FC236}">
-                <a16:creationId xmlns:a16="http://schemas.microsoft.com/office/drawing/2014/main" id="{E7FED627-9349-4D0D-B8D0-D67148395810}"/>
+                <a16:creationId xmlns:a16="http://schemas.microsoft.com/office/drawing/2014/main" id="{4EBBE2DB-C13A-4161-8286-EA1992A1C04A}"/>
               </a:ext>
             </a:extLst>
           </p:cNvPr>
@@ -245,7 +250,7 @@
           <p:cNvPr id="4" name="Date Placeholder 3">
             <a:extLst>
               <a:ext uri="{FF2B5EF4-FFF2-40B4-BE49-F238E27FC236}">
-                <a16:creationId xmlns:a16="http://schemas.microsoft.com/office/drawing/2014/main" id="{2346C009-3C83-454C-B509-32825BC61FCE}"/>
+                <a16:creationId xmlns:a16="http://schemas.microsoft.com/office/drawing/2014/main" id="{BE759BA6-8EC4-4362-8D66-219195806739}"/>
               </a:ext>
             </a:extLst>
           </p:cNvPr>
@@ -274,7 +279,7 @@
           <p:cNvPr id="5" name="Footer Placeholder 4">
             <a:extLst>
               <a:ext uri="{FF2B5EF4-FFF2-40B4-BE49-F238E27FC236}">
-                <a16:creationId xmlns:a16="http://schemas.microsoft.com/office/drawing/2014/main" id="{5652C838-48C3-41AF-B675-DB4A39773325}"/>
+                <a16:creationId xmlns:a16="http://schemas.microsoft.com/office/drawing/2014/main" id="{F3736ABE-7AD6-41F4-9BEE-A55F605BA6E1}"/>
               </a:ext>
             </a:extLst>
           </p:cNvPr>
@@ -299,7 +304,7 @@
           <p:cNvPr id="6" name="Slide Number Placeholder 5">
             <a:extLst>
               <a:ext uri="{FF2B5EF4-FFF2-40B4-BE49-F238E27FC236}">
-                <a16:creationId xmlns:a16="http://schemas.microsoft.com/office/drawing/2014/main" id="{85AFD623-02A8-4A6B-9295-888800AD4375}"/>
+                <a16:creationId xmlns:a16="http://schemas.microsoft.com/office/drawing/2014/main" id="{88CE69BD-E1F6-43F9-B7E1-40AA393B02E8}"/>
               </a:ext>
             </a:extLst>
           </p:cNvPr>
@@ -326,7 +331,7 @@
     </p:spTree>
     <p:extLst>
       <p:ext uri="{BB962C8B-B14F-4D97-AF65-F5344CB8AC3E}">
-        <p14:creationId xmlns:p14="http://schemas.microsoft.com/office/powerpoint/2010/main" val="1138584665"/>
+        <p14:creationId xmlns:p14="http://schemas.microsoft.com/office/powerpoint/2010/main" val="2351713167"/>
       </p:ext>
     </p:extLst>
   </p:cSld>
@@ -358,7 +363,7 @@
           <p:cNvPr id="2" name="Title 1">
             <a:extLst>
               <a:ext uri="{FF2B5EF4-FFF2-40B4-BE49-F238E27FC236}">
-                <a16:creationId xmlns:a16="http://schemas.microsoft.com/office/drawing/2014/main" id="{2DC4DAF5-1C00-4FF2-A8AC-9D9E84A2A7A3}"/>
+                <a16:creationId xmlns:a16="http://schemas.microsoft.com/office/drawing/2014/main" id="{F0E371C0-0B66-4548-A664-4FEA5ACEE510}"/>
               </a:ext>
             </a:extLst>
           </p:cNvPr>
@@ -386,7 +391,7 @@
           <p:cNvPr id="3" name="Vertical Text Placeholder 2">
             <a:extLst>
               <a:ext uri="{FF2B5EF4-FFF2-40B4-BE49-F238E27FC236}">
-                <a16:creationId xmlns:a16="http://schemas.microsoft.com/office/drawing/2014/main" id="{0C142165-50AE-4203-87F5-0B9D884F395C}"/>
+                <a16:creationId xmlns:a16="http://schemas.microsoft.com/office/drawing/2014/main" id="{9FEADA00-CED9-41AA-BBA0-111382238B79}"/>
               </a:ext>
             </a:extLst>
           </p:cNvPr>
@@ -443,7 +448,7 @@
           <p:cNvPr id="4" name="Date Placeholder 3">
             <a:extLst>
               <a:ext uri="{FF2B5EF4-FFF2-40B4-BE49-F238E27FC236}">
-                <a16:creationId xmlns:a16="http://schemas.microsoft.com/office/drawing/2014/main" id="{B01CB554-0AA7-47E9-B42A-8DFC664F0A8B}"/>
+                <a16:creationId xmlns:a16="http://schemas.microsoft.com/office/drawing/2014/main" id="{4C7222A5-789C-475D-9454-83443074804F}"/>
               </a:ext>
             </a:extLst>
           </p:cNvPr>
@@ -472,7 +477,7 @@
           <p:cNvPr id="5" name="Footer Placeholder 4">
             <a:extLst>
               <a:ext uri="{FF2B5EF4-FFF2-40B4-BE49-F238E27FC236}">
-                <a16:creationId xmlns:a16="http://schemas.microsoft.com/office/drawing/2014/main" id="{BDA0EC1A-709D-4464-B5FB-AEDEB8F71C73}"/>
+                <a16:creationId xmlns:a16="http://schemas.microsoft.com/office/drawing/2014/main" id="{66C90210-EE42-42D7-BE38-ACD049F9BB7B}"/>
               </a:ext>
             </a:extLst>
           </p:cNvPr>
@@ -497,7 +502,7 @@
           <p:cNvPr id="6" name="Slide Number Placeholder 5">
             <a:extLst>
               <a:ext uri="{FF2B5EF4-FFF2-40B4-BE49-F238E27FC236}">
-                <a16:creationId xmlns:a16="http://schemas.microsoft.com/office/drawing/2014/main" id="{7E9AE46F-A394-42D5-81C0-C98C2869BE20}"/>
+                <a16:creationId xmlns:a16="http://schemas.microsoft.com/office/drawing/2014/main" id="{7712F8AA-1777-49E0-9BDA-EFA0B201A506}"/>
               </a:ext>
             </a:extLst>
           </p:cNvPr>
@@ -524,7 +529,7 @@
     </p:spTree>
     <p:extLst>
       <p:ext uri="{BB962C8B-B14F-4D97-AF65-F5344CB8AC3E}">
-        <p14:creationId xmlns:p14="http://schemas.microsoft.com/office/powerpoint/2010/main" val="3659151989"/>
+        <p14:creationId xmlns:p14="http://schemas.microsoft.com/office/powerpoint/2010/main" val="2399206590"/>
       </p:ext>
     </p:extLst>
   </p:cSld>
@@ -556,7 +561,7 @@
           <p:cNvPr id="2" name="Vertical Title 1">
             <a:extLst>
               <a:ext uri="{FF2B5EF4-FFF2-40B4-BE49-F238E27FC236}">
-                <a16:creationId xmlns:a16="http://schemas.microsoft.com/office/drawing/2014/main" id="{FDBF5A25-A637-44AC-B997-F2D4BEEB81E6}"/>
+                <a16:creationId xmlns:a16="http://schemas.microsoft.com/office/drawing/2014/main" id="{F8F79653-43C6-4277-89C8-AB2D98206C06}"/>
               </a:ext>
             </a:extLst>
           </p:cNvPr>
@@ -589,7 +594,7 @@
           <p:cNvPr id="3" name="Vertical Text Placeholder 2">
             <a:extLst>
               <a:ext uri="{FF2B5EF4-FFF2-40B4-BE49-F238E27FC236}">
-                <a16:creationId xmlns:a16="http://schemas.microsoft.com/office/drawing/2014/main" id="{2E2BF82F-3975-47D0-A07E-2FDEA3003348}"/>
+                <a16:creationId xmlns:a16="http://schemas.microsoft.com/office/drawing/2014/main" id="{6C052D41-4DA6-4B4A-B9DE-613E8929007C}"/>
               </a:ext>
             </a:extLst>
           </p:cNvPr>
@@ -651,7 +656,7 @@
           <p:cNvPr id="4" name="Date Placeholder 3">
             <a:extLst>
               <a:ext uri="{FF2B5EF4-FFF2-40B4-BE49-F238E27FC236}">
-                <a16:creationId xmlns:a16="http://schemas.microsoft.com/office/drawing/2014/main" id="{FBED9CF2-6D46-4E30-86EF-37FE6D6A7534}"/>
+                <a16:creationId xmlns:a16="http://schemas.microsoft.com/office/drawing/2014/main" id="{CF387F3A-F7C0-460B-ACF6-5CFE9433DD5F}"/>
               </a:ext>
             </a:extLst>
           </p:cNvPr>
@@ -680,7 +685,7 @@
           <p:cNvPr id="5" name="Footer Placeholder 4">
             <a:extLst>
               <a:ext uri="{FF2B5EF4-FFF2-40B4-BE49-F238E27FC236}">
-                <a16:creationId xmlns:a16="http://schemas.microsoft.com/office/drawing/2014/main" id="{2FA0BD9B-0F91-483B-8B94-38BE8A0F3EA6}"/>
+                <a16:creationId xmlns:a16="http://schemas.microsoft.com/office/drawing/2014/main" id="{BEFC3B68-4602-4899-B720-FF808D88A918}"/>
               </a:ext>
             </a:extLst>
           </p:cNvPr>
@@ -705,7 +710,7 @@
           <p:cNvPr id="6" name="Slide Number Placeholder 5">
             <a:extLst>
               <a:ext uri="{FF2B5EF4-FFF2-40B4-BE49-F238E27FC236}">
-                <a16:creationId xmlns:a16="http://schemas.microsoft.com/office/drawing/2014/main" id="{44C21B5D-1718-4B43-975C-30CB7F625A02}"/>
+                <a16:creationId xmlns:a16="http://schemas.microsoft.com/office/drawing/2014/main" id="{E9508879-6794-4A09-8115-B80921A352BF}"/>
               </a:ext>
             </a:extLst>
           </p:cNvPr>
@@ -732,7 +737,7 @@
     </p:spTree>
     <p:extLst>
       <p:ext uri="{BB962C8B-B14F-4D97-AF65-F5344CB8AC3E}">
-        <p14:creationId xmlns:p14="http://schemas.microsoft.com/office/powerpoint/2010/main" val="1453414397"/>
+        <p14:creationId xmlns:p14="http://schemas.microsoft.com/office/powerpoint/2010/main" val="278630232"/>
       </p:ext>
     </p:extLst>
   </p:cSld>
@@ -764,7 +769,7 @@
           <p:cNvPr id="2" name="Title 1">
             <a:extLst>
               <a:ext uri="{FF2B5EF4-FFF2-40B4-BE49-F238E27FC236}">
-                <a16:creationId xmlns:a16="http://schemas.microsoft.com/office/drawing/2014/main" id="{09E5045F-2105-4AB1-BF57-27FD8677BDD3}"/>
+                <a16:creationId xmlns:a16="http://schemas.microsoft.com/office/drawing/2014/main" id="{A8E291E4-C54F-4C21-B244-4502A52F161B}"/>
               </a:ext>
             </a:extLst>
           </p:cNvPr>
@@ -792,7 +797,7 @@
           <p:cNvPr id="3" name="Content Placeholder 2">
             <a:extLst>
               <a:ext uri="{FF2B5EF4-FFF2-40B4-BE49-F238E27FC236}">
-                <a16:creationId xmlns:a16="http://schemas.microsoft.com/office/drawing/2014/main" id="{14A8516E-8B0E-4DA0-8259-A5E42125A5E2}"/>
+                <a16:creationId xmlns:a16="http://schemas.microsoft.com/office/drawing/2014/main" id="{44474402-09A7-4B68-BEAD-6341E56290BA}"/>
               </a:ext>
             </a:extLst>
           </p:cNvPr>
@@ -849,7 +854,7 @@
           <p:cNvPr id="4" name="Date Placeholder 3">
             <a:extLst>
               <a:ext uri="{FF2B5EF4-FFF2-40B4-BE49-F238E27FC236}">
-                <a16:creationId xmlns:a16="http://schemas.microsoft.com/office/drawing/2014/main" id="{FA03BA97-AFA7-4D29-9F86-553773076C69}"/>
+                <a16:creationId xmlns:a16="http://schemas.microsoft.com/office/drawing/2014/main" id="{68CEB73D-1CE2-47CC-8B01-595359669396}"/>
               </a:ext>
             </a:extLst>
           </p:cNvPr>
@@ -878,7 +883,7 @@
           <p:cNvPr id="5" name="Footer Placeholder 4">
             <a:extLst>
               <a:ext uri="{FF2B5EF4-FFF2-40B4-BE49-F238E27FC236}">
-                <a16:creationId xmlns:a16="http://schemas.microsoft.com/office/drawing/2014/main" id="{90BB3656-0E90-4498-BCD7-538BDF237F26}"/>
+                <a16:creationId xmlns:a16="http://schemas.microsoft.com/office/drawing/2014/main" id="{2CF03D51-51B9-4B8E-99DB-9200B1CACDD3}"/>
               </a:ext>
             </a:extLst>
           </p:cNvPr>
@@ -903,7 +908,7 @@
           <p:cNvPr id="6" name="Slide Number Placeholder 5">
             <a:extLst>
               <a:ext uri="{FF2B5EF4-FFF2-40B4-BE49-F238E27FC236}">
-                <a16:creationId xmlns:a16="http://schemas.microsoft.com/office/drawing/2014/main" id="{B516B105-EB14-4A91-A230-5DA50EF26352}"/>
+                <a16:creationId xmlns:a16="http://schemas.microsoft.com/office/drawing/2014/main" id="{26C9683F-9338-4ECF-A324-CDD10EBFDFA3}"/>
               </a:ext>
             </a:extLst>
           </p:cNvPr>
@@ -930,7 +935,7 @@
     </p:spTree>
     <p:extLst>
       <p:ext uri="{BB962C8B-B14F-4D97-AF65-F5344CB8AC3E}">
-        <p14:creationId xmlns:p14="http://schemas.microsoft.com/office/powerpoint/2010/main" val="624931750"/>
+        <p14:creationId xmlns:p14="http://schemas.microsoft.com/office/powerpoint/2010/main" val="1161741090"/>
       </p:ext>
     </p:extLst>
   </p:cSld>
@@ -962,7 +967,7 @@
           <p:cNvPr id="2" name="Title 1">
             <a:extLst>
               <a:ext uri="{FF2B5EF4-FFF2-40B4-BE49-F238E27FC236}">
-                <a16:creationId xmlns:a16="http://schemas.microsoft.com/office/drawing/2014/main" id="{6D27B538-9B9F-47C4-8C65-7792FB5DB44D}"/>
+                <a16:creationId xmlns:a16="http://schemas.microsoft.com/office/drawing/2014/main" id="{D70C9F76-1BF5-4154-BDE3-1B91CB7FED13}"/>
               </a:ext>
             </a:extLst>
           </p:cNvPr>
@@ -999,7 +1004,7 @@
           <p:cNvPr id="3" name="Text Placeholder 2">
             <a:extLst>
               <a:ext uri="{FF2B5EF4-FFF2-40B4-BE49-F238E27FC236}">
-                <a16:creationId xmlns:a16="http://schemas.microsoft.com/office/drawing/2014/main" id="{31EE682F-5D9E-4530-B842-BDDBACFC1A7C}"/>
+                <a16:creationId xmlns:a16="http://schemas.microsoft.com/office/drawing/2014/main" id="{56753634-CD67-4BE1-B210-1BFB8DBD5184}"/>
               </a:ext>
             </a:extLst>
           </p:cNvPr>
@@ -1124,7 +1129,7 @@
           <p:cNvPr id="4" name="Date Placeholder 3">
             <a:extLst>
               <a:ext uri="{FF2B5EF4-FFF2-40B4-BE49-F238E27FC236}">
-                <a16:creationId xmlns:a16="http://schemas.microsoft.com/office/drawing/2014/main" id="{917B7717-876D-49B8-AF3E-C01DD53FCD1C}"/>
+                <a16:creationId xmlns:a16="http://schemas.microsoft.com/office/drawing/2014/main" id="{2B214A72-FA3F-43BC-9CD0-AE8A6516E288}"/>
               </a:ext>
             </a:extLst>
           </p:cNvPr>
@@ -1153,7 +1158,7 @@
           <p:cNvPr id="5" name="Footer Placeholder 4">
             <a:extLst>
               <a:ext uri="{FF2B5EF4-FFF2-40B4-BE49-F238E27FC236}">
-                <a16:creationId xmlns:a16="http://schemas.microsoft.com/office/drawing/2014/main" id="{C4729BE6-381B-4064-A5E6-C438EB273805}"/>
+                <a16:creationId xmlns:a16="http://schemas.microsoft.com/office/drawing/2014/main" id="{A7322FD3-C996-45A0-812A-B28AA446CE99}"/>
               </a:ext>
             </a:extLst>
           </p:cNvPr>
@@ -1178,7 +1183,7 @@
           <p:cNvPr id="6" name="Slide Number Placeholder 5">
             <a:extLst>
               <a:ext uri="{FF2B5EF4-FFF2-40B4-BE49-F238E27FC236}">
-                <a16:creationId xmlns:a16="http://schemas.microsoft.com/office/drawing/2014/main" id="{F9A0D484-9947-46AF-8EFB-3652BC0DE68A}"/>
+                <a16:creationId xmlns:a16="http://schemas.microsoft.com/office/drawing/2014/main" id="{FA81A893-78CB-46DF-912D-69307B2966D1}"/>
               </a:ext>
             </a:extLst>
           </p:cNvPr>
@@ -1205,7 +1210,7 @@
     </p:spTree>
     <p:extLst>
       <p:ext uri="{BB962C8B-B14F-4D97-AF65-F5344CB8AC3E}">
-        <p14:creationId xmlns:p14="http://schemas.microsoft.com/office/powerpoint/2010/main" val="2171930323"/>
+        <p14:creationId xmlns:p14="http://schemas.microsoft.com/office/powerpoint/2010/main" val="3522816617"/>
       </p:ext>
     </p:extLst>
   </p:cSld>
@@ -1237,7 +1242,7 @@
           <p:cNvPr id="2" name="Title 1">
             <a:extLst>
               <a:ext uri="{FF2B5EF4-FFF2-40B4-BE49-F238E27FC236}">
-                <a16:creationId xmlns:a16="http://schemas.microsoft.com/office/drawing/2014/main" id="{44C924A7-86D6-444A-B3D8-5ACF33F478AC}"/>
+                <a16:creationId xmlns:a16="http://schemas.microsoft.com/office/drawing/2014/main" id="{50B3E0E6-1525-48FA-8B25-6F0B22F675B1}"/>
               </a:ext>
             </a:extLst>
           </p:cNvPr>
@@ -1265,7 +1270,7 @@
           <p:cNvPr id="3" name="Content Placeholder 2">
             <a:extLst>
               <a:ext uri="{FF2B5EF4-FFF2-40B4-BE49-F238E27FC236}">
-                <a16:creationId xmlns:a16="http://schemas.microsoft.com/office/drawing/2014/main" id="{5663B7C0-EA71-407F-801D-9818385891F8}"/>
+                <a16:creationId xmlns:a16="http://schemas.microsoft.com/office/drawing/2014/main" id="{E9043064-46EB-43C6-A76F-3E179DA62908}"/>
               </a:ext>
             </a:extLst>
           </p:cNvPr>
@@ -1327,7 +1332,7 @@
           <p:cNvPr id="4" name="Content Placeholder 3">
             <a:extLst>
               <a:ext uri="{FF2B5EF4-FFF2-40B4-BE49-F238E27FC236}">
-                <a16:creationId xmlns:a16="http://schemas.microsoft.com/office/drawing/2014/main" id="{F08388D6-FF92-4AEA-8791-0DF9B49DA4D2}"/>
+                <a16:creationId xmlns:a16="http://schemas.microsoft.com/office/drawing/2014/main" id="{9A5967FE-E245-4188-A471-B3ECD860D5D0}"/>
               </a:ext>
             </a:extLst>
           </p:cNvPr>
@@ -1389,7 +1394,7 @@
           <p:cNvPr id="5" name="Date Placeholder 4">
             <a:extLst>
               <a:ext uri="{FF2B5EF4-FFF2-40B4-BE49-F238E27FC236}">
-                <a16:creationId xmlns:a16="http://schemas.microsoft.com/office/drawing/2014/main" id="{FAE6EB53-C7A0-41D2-958F-BB791F3C40B7}"/>
+                <a16:creationId xmlns:a16="http://schemas.microsoft.com/office/drawing/2014/main" id="{B96F9991-CFBF-4642-BCA0-6431E8C3518A}"/>
               </a:ext>
             </a:extLst>
           </p:cNvPr>
@@ -1418,7 +1423,7 @@
           <p:cNvPr id="6" name="Footer Placeholder 5">
             <a:extLst>
               <a:ext uri="{FF2B5EF4-FFF2-40B4-BE49-F238E27FC236}">
-                <a16:creationId xmlns:a16="http://schemas.microsoft.com/office/drawing/2014/main" id="{C38F8825-046F-4BA3-BD13-8D7267DD618F}"/>
+                <a16:creationId xmlns:a16="http://schemas.microsoft.com/office/drawing/2014/main" id="{952FEB40-CF4B-4252-87EA-B77FD00C70AF}"/>
               </a:ext>
             </a:extLst>
           </p:cNvPr>
@@ -1443,7 +1448,7 @@
           <p:cNvPr id="7" name="Slide Number Placeholder 6">
             <a:extLst>
               <a:ext uri="{FF2B5EF4-FFF2-40B4-BE49-F238E27FC236}">
-                <a16:creationId xmlns:a16="http://schemas.microsoft.com/office/drawing/2014/main" id="{10315BEE-11AC-4488-B2FB-9D043AA00018}"/>
+                <a16:creationId xmlns:a16="http://schemas.microsoft.com/office/drawing/2014/main" id="{86B57D4B-8C5C-4FEE-A48F-B0B4A724FB17}"/>
               </a:ext>
             </a:extLst>
           </p:cNvPr>
@@ -1470,7 +1475,7 @@
     </p:spTree>
     <p:extLst>
       <p:ext uri="{BB962C8B-B14F-4D97-AF65-F5344CB8AC3E}">
-        <p14:creationId xmlns:p14="http://schemas.microsoft.com/office/powerpoint/2010/main" val="997468468"/>
+        <p14:creationId xmlns:p14="http://schemas.microsoft.com/office/powerpoint/2010/main" val="2926838172"/>
       </p:ext>
     </p:extLst>
   </p:cSld>
@@ -1502,7 +1507,7 @@
           <p:cNvPr id="2" name="Title 1">
             <a:extLst>
               <a:ext uri="{FF2B5EF4-FFF2-40B4-BE49-F238E27FC236}">
-                <a16:creationId xmlns:a16="http://schemas.microsoft.com/office/drawing/2014/main" id="{7EC35AFE-9D25-4A47-8CFF-271927D51526}"/>
+                <a16:creationId xmlns:a16="http://schemas.microsoft.com/office/drawing/2014/main" id="{DE7CEDAE-88BE-4BC7-AA20-591246F05207}"/>
               </a:ext>
             </a:extLst>
           </p:cNvPr>
@@ -1535,7 +1540,7 @@
           <p:cNvPr id="3" name="Text Placeholder 2">
             <a:extLst>
               <a:ext uri="{FF2B5EF4-FFF2-40B4-BE49-F238E27FC236}">
-                <a16:creationId xmlns:a16="http://schemas.microsoft.com/office/drawing/2014/main" id="{9969FBD0-20C3-495C-A00B-27290863321A}"/>
+                <a16:creationId xmlns:a16="http://schemas.microsoft.com/office/drawing/2014/main" id="{C31BAC39-2BDA-41B4-B3FA-B22CD0A97550}"/>
               </a:ext>
             </a:extLst>
           </p:cNvPr>
@@ -1606,7 +1611,7 @@
           <p:cNvPr id="4" name="Content Placeholder 3">
             <a:extLst>
               <a:ext uri="{FF2B5EF4-FFF2-40B4-BE49-F238E27FC236}">
-                <a16:creationId xmlns:a16="http://schemas.microsoft.com/office/drawing/2014/main" id="{FDD40F4F-538B-4C52-8490-4099355932BD}"/>
+                <a16:creationId xmlns:a16="http://schemas.microsoft.com/office/drawing/2014/main" id="{88E4C36D-E4C5-46C8-93B2-5C4CAA517F36}"/>
               </a:ext>
             </a:extLst>
           </p:cNvPr>
@@ -1668,7 +1673,7 @@
           <p:cNvPr id="5" name="Text Placeholder 4">
             <a:extLst>
               <a:ext uri="{FF2B5EF4-FFF2-40B4-BE49-F238E27FC236}">
-                <a16:creationId xmlns:a16="http://schemas.microsoft.com/office/drawing/2014/main" id="{0244ADD4-C9DA-40AE-9399-93058AC55D9F}"/>
+                <a16:creationId xmlns:a16="http://schemas.microsoft.com/office/drawing/2014/main" id="{BA76C4EA-CA14-4BAB-95DE-91F053B8B254}"/>
               </a:ext>
             </a:extLst>
           </p:cNvPr>
@@ -1739,7 +1744,7 @@
           <p:cNvPr id="6" name="Content Placeholder 5">
             <a:extLst>
               <a:ext uri="{FF2B5EF4-FFF2-40B4-BE49-F238E27FC236}">
-                <a16:creationId xmlns:a16="http://schemas.microsoft.com/office/drawing/2014/main" id="{803C3149-D184-4940-B988-CD49ACA7F9B1}"/>
+                <a16:creationId xmlns:a16="http://schemas.microsoft.com/office/drawing/2014/main" id="{4F860075-BC54-4C7F-94EF-16D058643FD2}"/>
               </a:ext>
             </a:extLst>
           </p:cNvPr>
@@ -1801,7 +1806,7 @@
           <p:cNvPr id="7" name="Date Placeholder 6">
             <a:extLst>
               <a:ext uri="{FF2B5EF4-FFF2-40B4-BE49-F238E27FC236}">
-                <a16:creationId xmlns:a16="http://schemas.microsoft.com/office/drawing/2014/main" id="{66803E27-5FAB-499D-9BFD-E5DFB01DCB25}"/>
+                <a16:creationId xmlns:a16="http://schemas.microsoft.com/office/drawing/2014/main" id="{5FC6C688-C53B-4D86-81A7-D23875F2C8B0}"/>
               </a:ext>
             </a:extLst>
           </p:cNvPr>
@@ -1830,7 +1835,7 @@
           <p:cNvPr id="8" name="Footer Placeholder 7">
             <a:extLst>
               <a:ext uri="{FF2B5EF4-FFF2-40B4-BE49-F238E27FC236}">
-                <a16:creationId xmlns:a16="http://schemas.microsoft.com/office/drawing/2014/main" id="{64177417-BECF-4D62-8275-90B525EEF6A9}"/>
+                <a16:creationId xmlns:a16="http://schemas.microsoft.com/office/drawing/2014/main" id="{B050D8D2-89EA-4FAE-AA98-BD007C73C646}"/>
               </a:ext>
             </a:extLst>
           </p:cNvPr>
@@ -1855,7 +1860,7 @@
           <p:cNvPr id="9" name="Slide Number Placeholder 8">
             <a:extLst>
               <a:ext uri="{FF2B5EF4-FFF2-40B4-BE49-F238E27FC236}">
-                <a16:creationId xmlns:a16="http://schemas.microsoft.com/office/drawing/2014/main" id="{9D33AD16-6325-4255-9569-4222EC9BD7EA}"/>
+                <a16:creationId xmlns:a16="http://schemas.microsoft.com/office/drawing/2014/main" id="{14051691-40F4-4163-BA58-8E5C642FB3C0}"/>
               </a:ext>
             </a:extLst>
           </p:cNvPr>
@@ -1882,7 +1887,7 @@
     </p:spTree>
     <p:extLst>
       <p:ext uri="{BB962C8B-B14F-4D97-AF65-F5344CB8AC3E}">
-        <p14:creationId xmlns:p14="http://schemas.microsoft.com/office/powerpoint/2010/main" val="4084709278"/>
+        <p14:creationId xmlns:p14="http://schemas.microsoft.com/office/powerpoint/2010/main" val="787146350"/>
       </p:ext>
     </p:extLst>
   </p:cSld>
@@ -1914,7 +1919,7 @@
           <p:cNvPr id="2" name="Title 1">
             <a:extLst>
               <a:ext uri="{FF2B5EF4-FFF2-40B4-BE49-F238E27FC236}">
-                <a16:creationId xmlns:a16="http://schemas.microsoft.com/office/drawing/2014/main" id="{04172735-BCFF-47AB-86A6-79F69273E6DC}"/>
+                <a16:creationId xmlns:a16="http://schemas.microsoft.com/office/drawing/2014/main" id="{C89AF4D4-ECED-4384-A772-D4BC559DD21B}"/>
               </a:ext>
             </a:extLst>
           </p:cNvPr>
@@ -1942,7 +1947,7 @@
           <p:cNvPr id="3" name="Date Placeholder 2">
             <a:extLst>
               <a:ext uri="{FF2B5EF4-FFF2-40B4-BE49-F238E27FC236}">
-                <a16:creationId xmlns:a16="http://schemas.microsoft.com/office/drawing/2014/main" id="{C2034596-A78D-4E70-A1DF-2BA3A2AB9C60}"/>
+                <a16:creationId xmlns:a16="http://schemas.microsoft.com/office/drawing/2014/main" id="{1FEA346B-60A6-4AAE-A04C-773458D9AA18}"/>
               </a:ext>
             </a:extLst>
           </p:cNvPr>
@@ -1971,7 +1976,7 @@
           <p:cNvPr id="4" name="Footer Placeholder 3">
             <a:extLst>
               <a:ext uri="{FF2B5EF4-FFF2-40B4-BE49-F238E27FC236}">
-                <a16:creationId xmlns:a16="http://schemas.microsoft.com/office/drawing/2014/main" id="{B08C90BF-B9AF-4DE3-B34E-589178AAEFC5}"/>
+                <a16:creationId xmlns:a16="http://schemas.microsoft.com/office/drawing/2014/main" id="{AC99DD32-6C9F-4542-9275-59DD5D815DAF}"/>
               </a:ext>
             </a:extLst>
           </p:cNvPr>
@@ -1996,7 +2001,7 @@
           <p:cNvPr id="5" name="Slide Number Placeholder 4">
             <a:extLst>
               <a:ext uri="{FF2B5EF4-FFF2-40B4-BE49-F238E27FC236}">
-                <a16:creationId xmlns:a16="http://schemas.microsoft.com/office/drawing/2014/main" id="{99C597A6-DE5C-4C57-A180-85DB12CFCD23}"/>
+                <a16:creationId xmlns:a16="http://schemas.microsoft.com/office/drawing/2014/main" id="{292A23E2-A87F-49F3-A16E-1AC40019A2AF}"/>
               </a:ext>
             </a:extLst>
           </p:cNvPr>
@@ -2023,7 +2028,7 @@
     </p:spTree>
     <p:extLst>
       <p:ext uri="{BB962C8B-B14F-4D97-AF65-F5344CB8AC3E}">
-        <p14:creationId xmlns:p14="http://schemas.microsoft.com/office/powerpoint/2010/main" val="2176024909"/>
+        <p14:creationId xmlns:p14="http://schemas.microsoft.com/office/powerpoint/2010/main" val="2254999963"/>
       </p:ext>
     </p:extLst>
   </p:cSld>
@@ -2055,7 +2060,7 @@
           <p:cNvPr id="2" name="Date Placeholder 1">
             <a:extLst>
               <a:ext uri="{FF2B5EF4-FFF2-40B4-BE49-F238E27FC236}">
-                <a16:creationId xmlns:a16="http://schemas.microsoft.com/office/drawing/2014/main" id="{C8AD7EDD-E7E3-4599-804F-404D33E8F279}"/>
+                <a16:creationId xmlns:a16="http://schemas.microsoft.com/office/drawing/2014/main" id="{EF49DF4B-0D73-476F-A930-A42397E0D9B6}"/>
               </a:ext>
             </a:extLst>
           </p:cNvPr>
@@ -2084,7 +2089,7 @@
           <p:cNvPr id="3" name="Footer Placeholder 2">
             <a:extLst>
               <a:ext uri="{FF2B5EF4-FFF2-40B4-BE49-F238E27FC236}">
-                <a16:creationId xmlns:a16="http://schemas.microsoft.com/office/drawing/2014/main" id="{113422DC-FA08-4D3C-B93B-AE0ADD74FB8F}"/>
+                <a16:creationId xmlns:a16="http://schemas.microsoft.com/office/drawing/2014/main" id="{3FF61A31-45AB-4F16-BE37-E2EC1EE3D692}"/>
               </a:ext>
             </a:extLst>
           </p:cNvPr>
@@ -2109,7 +2114,7 @@
           <p:cNvPr id="4" name="Slide Number Placeholder 3">
             <a:extLst>
               <a:ext uri="{FF2B5EF4-FFF2-40B4-BE49-F238E27FC236}">
-                <a16:creationId xmlns:a16="http://schemas.microsoft.com/office/drawing/2014/main" id="{1B02FC8B-EF19-46F9-9E28-8FA09E152805}"/>
+                <a16:creationId xmlns:a16="http://schemas.microsoft.com/office/drawing/2014/main" id="{19D3ED9C-B469-44EB-9DAE-D7CEDA3D5A5A}"/>
               </a:ext>
             </a:extLst>
           </p:cNvPr>
@@ -2136,7 +2141,7 @@
     </p:spTree>
     <p:extLst>
       <p:ext uri="{BB962C8B-B14F-4D97-AF65-F5344CB8AC3E}">
-        <p14:creationId xmlns:p14="http://schemas.microsoft.com/office/powerpoint/2010/main" val="2054699668"/>
+        <p14:creationId xmlns:p14="http://schemas.microsoft.com/office/powerpoint/2010/main" val="3728041205"/>
       </p:ext>
     </p:extLst>
   </p:cSld>
@@ -2168,7 +2173,7 @@
           <p:cNvPr id="2" name="Title 1">
             <a:extLst>
               <a:ext uri="{FF2B5EF4-FFF2-40B4-BE49-F238E27FC236}">
-                <a16:creationId xmlns:a16="http://schemas.microsoft.com/office/drawing/2014/main" id="{EBA4BF20-2363-4B99-9694-800B876CDB3B}"/>
+                <a16:creationId xmlns:a16="http://schemas.microsoft.com/office/drawing/2014/main" id="{A584AB06-A8D3-4D6F-A2E4-49869572CA50}"/>
               </a:ext>
             </a:extLst>
           </p:cNvPr>
@@ -2205,7 +2210,7 @@
           <p:cNvPr id="3" name="Content Placeholder 2">
             <a:extLst>
               <a:ext uri="{FF2B5EF4-FFF2-40B4-BE49-F238E27FC236}">
-                <a16:creationId xmlns:a16="http://schemas.microsoft.com/office/drawing/2014/main" id="{F2E06C7F-8BEC-46F8-B233-74401F5CCB8E}"/>
+                <a16:creationId xmlns:a16="http://schemas.microsoft.com/office/drawing/2014/main" id="{5A9F0C15-D18B-44A7-82EC-F8ABC3722DA2}"/>
               </a:ext>
             </a:extLst>
           </p:cNvPr>
@@ -2295,7 +2300,7 @@
           <p:cNvPr id="4" name="Text Placeholder 3">
             <a:extLst>
               <a:ext uri="{FF2B5EF4-FFF2-40B4-BE49-F238E27FC236}">
-                <a16:creationId xmlns:a16="http://schemas.microsoft.com/office/drawing/2014/main" id="{D5535243-0D16-47B0-8295-0762CC73A2F7}"/>
+                <a16:creationId xmlns:a16="http://schemas.microsoft.com/office/drawing/2014/main" id="{2A63545E-ADDD-497C-BF90-8860CC98045F}"/>
               </a:ext>
             </a:extLst>
           </p:cNvPr>
@@ -2366,7 +2371,7 @@
           <p:cNvPr id="5" name="Date Placeholder 4">
             <a:extLst>
               <a:ext uri="{FF2B5EF4-FFF2-40B4-BE49-F238E27FC236}">
-                <a16:creationId xmlns:a16="http://schemas.microsoft.com/office/drawing/2014/main" id="{BAB8E392-C807-4958-BB20-B8B191D3335D}"/>
+                <a16:creationId xmlns:a16="http://schemas.microsoft.com/office/drawing/2014/main" id="{67996944-2981-4CCF-9E7D-5F84669DCA52}"/>
               </a:ext>
             </a:extLst>
           </p:cNvPr>
@@ -2395,7 +2400,7 @@
           <p:cNvPr id="6" name="Footer Placeholder 5">
             <a:extLst>
               <a:ext uri="{FF2B5EF4-FFF2-40B4-BE49-F238E27FC236}">
-                <a16:creationId xmlns:a16="http://schemas.microsoft.com/office/drawing/2014/main" id="{06DD53D5-28CB-4714-A935-F3D971533F4E}"/>
+                <a16:creationId xmlns:a16="http://schemas.microsoft.com/office/drawing/2014/main" id="{C445D83A-C698-4211-B873-37E5FCC1BB79}"/>
               </a:ext>
             </a:extLst>
           </p:cNvPr>
@@ -2420,7 +2425,7 @@
           <p:cNvPr id="7" name="Slide Number Placeholder 6">
             <a:extLst>
               <a:ext uri="{FF2B5EF4-FFF2-40B4-BE49-F238E27FC236}">
-                <a16:creationId xmlns:a16="http://schemas.microsoft.com/office/drawing/2014/main" id="{13EFB139-7848-4E7C-8BCA-D90067EF6457}"/>
+                <a16:creationId xmlns:a16="http://schemas.microsoft.com/office/drawing/2014/main" id="{F7E3D35B-1E8C-4EF2-B7A6-7BACCBCC5B6F}"/>
               </a:ext>
             </a:extLst>
           </p:cNvPr>
@@ -2447,7 +2452,7 @@
     </p:spTree>
     <p:extLst>
       <p:ext uri="{BB962C8B-B14F-4D97-AF65-F5344CB8AC3E}">
-        <p14:creationId xmlns:p14="http://schemas.microsoft.com/office/powerpoint/2010/main" val="1487550974"/>
+        <p14:creationId xmlns:p14="http://schemas.microsoft.com/office/powerpoint/2010/main" val="3736966521"/>
       </p:ext>
     </p:extLst>
   </p:cSld>
@@ -2479,7 +2484,7 @@
           <p:cNvPr id="2" name="Title 1">
             <a:extLst>
               <a:ext uri="{FF2B5EF4-FFF2-40B4-BE49-F238E27FC236}">
-                <a16:creationId xmlns:a16="http://schemas.microsoft.com/office/drawing/2014/main" id="{25B3B1F6-056B-4B5F-8338-782059DD4D8B}"/>
+                <a16:creationId xmlns:a16="http://schemas.microsoft.com/office/drawing/2014/main" id="{4E2D084A-CFC8-4C69-8743-90A4163DEEDD}"/>
               </a:ext>
             </a:extLst>
           </p:cNvPr>
@@ -2516,7 +2521,7 @@
           <p:cNvPr id="3" name="Picture Placeholder 2">
             <a:extLst>
               <a:ext uri="{FF2B5EF4-FFF2-40B4-BE49-F238E27FC236}">
-                <a16:creationId xmlns:a16="http://schemas.microsoft.com/office/drawing/2014/main" id="{9D032A4B-63D6-4698-A613-731920696BB5}"/>
+                <a16:creationId xmlns:a16="http://schemas.microsoft.com/office/drawing/2014/main" id="{0892939B-C285-41CF-832F-B019142B4C24}"/>
               </a:ext>
             </a:extLst>
           </p:cNvPr>
@@ -2583,7 +2588,7 @@
           <p:cNvPr id="4" name="Text Placeholder 3">
             <a:extLst>
               <a:ext uri="{FF2B5EF4-FFF2-40B4-BE49-F238E27FC236}">
-                <a16:creationId xmlns:a16="http://schemas.microsoft.com/office/drawing/2014/main" id="{E665CF9D-659C-4E9C-837F-8301001A3359}"/>
+                <a16:creationId xmlns:a16="http://schemas.microsoft.com/office/drawing/2014/main" id="{3AED83C3-3441-42CF-9FBC-C966C3FAA150}"/>
               </a:ext>
             </a:extLst>
           </p:cNvPr>
@@ -2654,7 +2659,7 @@
           <p:cNvPr id="5" name="Date Placeholder 4">
             <a:extLst>
               <a:ext uri="{FF2B5EF4-FFF2-40B4-BE49-F238E27FC236}">
-                <a16:creationId xmlns:a16="http://schemas.microsoft.com/office/drawing/2014/main" id="{48CD18ED-92D1-4BD9-89DE-B1529635C81D}"/>
+                <a16:creationId xmlns:a16="http://schemas.microsoft.com/office/drawing/2014/main" id="{3FC8A6B6-222D-4A2E-82EC-1F74AC17B25D}"/>
               </a:ext>
             </a:extLst>
           </p:cNvPr>
@@ -2683,7 +2688,7 @@
           <p:cNvPr id="6" name="Footer Placeholder 5">
             <a:extLst>
               <a:ext uri="{FF2B5EF4-FFF2-40B4-BE49-F238E27FC236}">
-                <a16:creationId xmlns:a16="http://schemas.microsoft.com/office/drawing/2014/main" id="{53DD9537-FD9B-4252-845F-48BB72E86A10}"/>
+                <a16:creationId xmlns:a16="http://schemas.microsoft.com/office/drawing/2014/main" id="{97F873F9-0E49-4669-8F78-65BF0D765A11}"/>
               </a:ext>
             </a:extLst>
           </p:cNvPr>
@@ -2708,7 +2713,7 @@
           <p:cNvPr id="7" name="Slide Number Placeholder 6">
             <a:extLst>
               <a:ext uri="{FF2B5EF4-FFF2-40B4-BE49-F238E27FC236}">
-                <a16:creationId xmlns:a16="http://schemas.microsoft.com/office/drawing/2014/main" id="{D440B164-2445-42A2-8365-132D61170F0B}"/>
+                <a16:creationId xmlns:a16="http://schemas.microsoft.com/office/drawing/2014/main" id="{FB4C12D7-9CD1-4C99-8A18-EBF804FB5C95}"/>
               </a:ext>
             </a:extLst>
           </p:cNvPr>
@@ -2735,7 +2740,7 @@
     </p:spTree>
     <p:extLst>
       <p:ext uri="{BB962C8B-B14F-4D97-AF65-F5344CB8AC3E}">
-        <p14:creationId xmlns:p14="http://schemas.microsoft.com/office/powerpoint/2010/main" val="3557387993"/>
+        <p14:creationId xmlns:p14="http://schemas.microsoft.com/office/powerpoint/2010/main" val="2285319106"/>
       </p:ext>
     </p:extLst>
   </p:cSld>
@@ -2772,7 +2777,7 @@
           <p:cNvPr id="2" name="Title Placeholder 1">
             <a:extLst>
               <a:ext uri="{FF2B5EF4-FFF2-40B4-BE49-F238E27FC236}">
-                <a16:creationId xmlns:a16="http://schemas.microsoft.com/office/drawing/2014/main" id="{9BA94617-D213-4EA7-894B-4F769A80F861}"/>
+                <a16:creationId xmlns:a16="http://schemas.microsoft.com/office/drawing/2014/main" id="{85EB93D4-4EEF-434E-8ECA-A4FC1BA79679}"/>
               </a:ext>
             </a:extLst>
           </p:cNvPr>
@@ -2810,7 +2815,7 @@
           <p:cNvPr id="3" name="Text Placeholder 2">
             <a:extLst>
               <a:ext uri="{FF2B5EF4-FFF2-40B4-BE49-F238E27FC236}">
-                <a16:creationId xmlns:a16="http://schemas.microsoft.com/office/drawing/2014/main" id="{8B5C1722-8A05-4B03-9695-0374F62E0A07}"/>
+                <a16:creationId xmlns:a16="http://schemas.microsoft.com/office/drawing/2014/main" id="{EBE0A337-5755-4EA2-91EB-5E1959BB78CA}"/>
               </a:ext>
             </a:extLst>
           </p:cNvPr>
@@ -2877,7 +2882,7 @@
           <p:cNvPr id="4" name="Date Placeholder 3">
             <a:extLst>
               <a:ext uri="{FF2B5EF4-FFF2-40B4-BE49-F238E27FC236}">
-                <a16:creationId xmlns:a16="http://schemas.microsoft.com/office/drawing/2014/main" id="{0A15483A-547D-4A10-9498-C76F50ED5B89}"/>
+                <a16:creationId xmlns:a16="http://schemas.microsoft.com/office/drawing/2014/main" id="{8EF2A6DC-1386-40E7-A94A-799AA46228CD}"/>
               </a:ext>
             </a:extLst>
           </p:cNvPr>
@@ -2924,7 +2929,7 @@
           <p:cNvPr id="5" name="Footer Placeholder 4">
             <a:extLst>
               <a:ext uri="{FF2B5EF4-FFF2-40B4-BE49-F238E27FC236}">
-                <a16:creationId xmlns:a16="http://schemas.microsoft.com/office/drawing/2014/main" id="{FA370EB4-6E7B-476B-91ED-F958538A47CD}"/>
+                <a16:creationId xmlns:a16="http://schemas.microsoft.com/office/drawing/2014/main" id="{81F1BF9F-5284-48DC-88FF-924E3AF2CAF1}"/>
               </a:ext>
             </a:extLst>
           </p:cNvPr>
@@ -2967,7 +2972,7 @@
           <p:cNvPr id="6" name="Slide Number Placeholder 5">
             <a:extLst>
               <a:ext uri="{FF2B5EF4-FFF2-40B4-BE49-F238E27FC236}">
-                <a16:creationId xmlns:a16="http://schemas.microsoft.com/office/drawing/2014/main" id="{79B3CDD7-2660-44F7-BBD1-782162463EF5}"/>
+                <a16:creationId xmlns:a16="http://schemas.microsoft.com/office/drawing/2014/main" id="{10AC0CEC-B143-42A6-AD96-76ADFDA28549}"/>
               </a:ext>
             </a:extLst>
           </p:cNvPr>
@@ -3012,23 +3017,23 @@
     </p:spTree>
     <p:extLst>
       <p:ext uri="{BB962C8B-B14F-4D97-AF65-F5344CB8AC3E}">
-        <p14:creationId xmlns:p14="http://schemas.microsoft.com/office/powerpoint/2010/main" val="3953425414"/>
+        <p14:creationId xmlns:p14="http://schemas.microsoft.com/office/powerpoint/2010/main" val="1767055923"/>
       </p:ext>
     </p:extLst>
   </p:cSld>
   <p:clrMap bg1="lt1" tx1="dk1" bg2="lt2" tx2="dk2" accent1="accent1" accent2="accent2" accent3="accent3" accent4="accent4" accent5="accent5" accent6="accent6" hlink="hlink" folHlink="folHlink"/>
   <p:sldLayoutIdLst>
-    <p:sldLayoutId id="2147483649" r:id="rId1"/>
-    <p:sldLayoutId id="2147483650" r:id="rId2"/>
-    <p:sldLayoutId id="2147483651" r:id="rId3"/>
-    <p:sldLayoutId id="2147483652" r:id="rId4"/>
-    <p:sldLayoutId id="2147483653" r:id="rId5"/>
-    <p:sldLayoutId id="2147483654" r:id="rId6"/>
-    <p:sldLayoutId id="2147483655" r:id="rId7"/>
-    <p:sldLayoutId id="2147483656" r:id="rId8"/>
-    <p:sldLayoutId id="2147483657" r:id="rId9"/>
-    <p:sldLayoutId id="2147483658" r:id="rId10"/>
-    <p:sldLayoutId id="2147483659" r:id="rId11"/>
+    <p:sldLayoutId id="2147483751" r:id="rId1"/>
+    <p:sldLayoutId id="2147483752" r:id="rId2"/>
+    <p:sldLayoutId id="2147483753" r:id="rId3"/>
+    <p:sldLayoutId id="2147483754" r:id="rId4"/>
+    <p:sldLayoutId id="2147483755" r:id="rId5"/>
+    <p:sldLayoutId id="2147483756" r:id="rId6"/>
+    <p:sldLayoutId id="2147483757" r:id="rId7"/>
+    <p:sldLayoutId id="2147483758" r:id="rId8"/>
+    <p:sldLayoutId id="2147483759" r:id="rId9"/>
+    <p:sldLayoutId id="2147483760" r:id="rId10"/>
+    <p:sldLayoutId id="2147483761" r:id="rId11"/>
   </p:sldLayoutIdLst>
   <p:txStyles>
     <p:titleStyle>
@@ -3396,6 +3401,18 @@
   <p:clrMapOvr>
     <a:masterClrMapping/>
   </p:clrMapOvr>
+  <mc:AlternateContent xmlns:mc="http://schemas.openxmlformats.org/markup-compatibility/2006">
+    <mc:Choice xmlns:p159="http://schemas.microsoft.com/office/powerpoint/2015/09/main" Requires="p159">
+      <p:transition xmlns:p14="http://schemas.microsoft.com/office/powerpoint/2010/main" spd="slow" p14:dur="2000">
+        <p159:morph option="byObject"/>
+      </p:transition>
+    </mc:Choice>
+    <mc:Fallback>
+      <p:transition spd="slow">
+        <p:fade/>
+      </p:transition>
+    </mc:Fallback>
+  </mc:AlternateContent>
 </p:sld>
 </file>
 
@@ -3527,7 +3544,7 @@
           <a:p>
             <a:r>
               <a:rPr lang="en-US" dirty="0"/>
-              <a:t>Project Overview</a:t>
+              <a:t>Initial thoughts on data</a:t>
             </a:r>
           </a:p>
         </p:txBody>
@@ -3553,7 +3570,27 @@
           <a:bodyPr/>
           <a:lstStyle/>
           <a:p>
-            <a:endParaRPr lang="en-US"/>
+            <a:r>
+              <a:rPr lang="en-US" dirty="0"/>
+              <a:t>We did not expect to be such a large correlation between median income and number of degrees earned. </a:t>
+            </a:r>
+          </a:p>
+          <a:p>
+            <a:r>
+              <a:rPr lang="en-US" dirty="0"/>
+              <a:t> No expected correlation between poverty rate and degrees earned. </a:t>
+            </a:r>
+          </a:p>
+          <a:p>
+            <a:r>
+              <a:rPr lang="en-US" dirty="0"/>
+              <a:t> As degrees earned rises, the unemployment rate </a:t>
+            </a:r>
+            <a:r>
+              <a:rPr lang="en-US"/>
+              <a:t>goes down. </a:t>
+            </a:r>
+            <a:endParaRPr lang="en-US" dirty="0"/>
           </a:p>
         </p:txBody>
       </p:sp>

</xml_diff>

<commit_message>
Update Project 1 Presentation.pptx
</commit_message>
<xml_diff>
--- a/Resources/Project 1 Presentation.pptx
+++ b/Resources/Project 1 Presentation.pptx
@@ -6,15 +6,16 @@
   </p:sldMasterIdLst>
   <p:sldIdLst>
     <p:sldId id="256" r:id="rId2"/>
-    <p:sldId id="257" r:id="rId3"/>
-    <p:sldId id="258" r:id="rId4"/>
-    <p:sldId id="259" r:id="rId5"/>
-    <p:sldId id="260" r:id="rId6"/>
-    <p:sldId id="261" r:id="rId7"/>
-    <p:sldId id="262" r:id="rId8"/>
-    <p:sldId id="263" r:id="rId9"/>
-    <p:sldId id="264" r:id="rId10"/>
-    <p:sldId id="265" r:id="rId11"/>
+    <p:sldId id="266" r:id="rId3"/>
+    <p:sldId id="257" r:id="rId4"/>
+    <p:sldId id="258" r:id="rId5"/>
+    <p:sldId id="259" r:id="rId6"/>
+    <p:sldId id="260" r:id="rId7"/>
+    <p:sldId id="261" r:id="rId8"/>
+    <p:sldId id="262" r:id="rId9"/>
+    <p:sldId id="263" r:id="rId10"/>
+    <p:sldId id="264" r:id="rId11"/>
+    <p:sldId id="265" r:id="rId12"/>
   </p:sldIdLst>
   <p:sldSz cx="12192000" cy="6858000"/>
   <p:notesSz cx="6858000" cy="9144000"/>
@@ -268,7 +269,7 @@
           <a:p>
             <a:fld id="{E6BC612A-EF24-48E6-916B-F574F5F03627}" type="datetimeFigureOut">
               <a:rPr lang="en-US" smtClean="0"/>
-              <a:t>9/16/2021</a:t>
+              <a:t>9/17/2021</a:t>
             </a:fld>
             <a:endParaRPr lang="en-US"/>
           </a:p>
@@ -466,7 +467,7 @@
           <a:p>
             <a:fld id="{E6BC612A-EF24-48E6-916B-F574F5F03627}" type="datetimeFigureOut">
               <a:rPr lang="en-US" smtClean="0"/>
-              <a:t>9/16/2021</a:t>
+              <a:t>9/17/2021</a:t>
             </a:fld>
             <a:endParaRPr lang="en-US"/>
           </a:p>
@@ -674,7 +675,7 @@
           <a:p>
             <a:fld id="{E6BC612A-EF24-48E6-916B-F574F5F03627}" type="datetimeFigureOut">
               <a:rPr lang="en-US" smtClean="0"/>
-              <a:t>9/16/2021</a:t>
+              <a:t>9/17/2021</a:t>
             </a:fld>
             <a:endParaRPr lang="en-US"/>
           </a:p>
@@ -872,7 +873,7 @@
           <a:p>
             <a:fld id="{E6BC612A-EF24-48E6-916B-F574F5F03627}" type="datetimeFigureOut">
               <a:rPr lang="en-US" smtClean="0"/>
-              <a:t>9/16/2021</a:t>
+              <a:t>9/17/2021</a:t>
             </a:fld>
             <a:endParaRPr lang="en-US"/>
           </a:p>
@@ -1147,7 +1148,7 @@
           <a:p>
             <a:fld id="{E6BC612A-EF24-48E6-916B-F574F5F03627}" type="datetimeFigureOut">
               <a:rPr lang="en-US" smtClean="0"/>
-              <a:t>9/16/2021</a:t>
+              <a:t>9/17/2021</a:t>
             </a:fld>
             <a:endParaRPr lang="en-US"/>
           </a:p>
@@ -1412,7 +1413,7 @@
           <a:p>
             <a:fld id="{E6BC612A-EF24-48E6-916B-F574F5F03627}" type="datetimeFigureOut">
               <a:rPr lang="en-US" smtClean="0"/>
-              <a:t>9/16/2021</a:t>
+              <a:t>9/17/2021</a:t>
             </a:fld>
             <a:endParaRPr lang="en-US"/>
           </a:p>
@@ -1824,7 +1825,7 @@
           <a:p>
             <a:fld id="{E6BC612A-EF24-48E6-916B-F574F5F03627}" type="datetimeFigureOut">
               <a:rPr lang="en-US" smtClean="0"/>
-              <a:t>9/16/2021</a:t>
+              <a:t>9/17/2021</a:t>
             </a:fld>
             <a:endParaRPr lang="en-US"/>
           </a:p>
@@ -1965,7 +1966,7 @@
           <a:p>
             <a:fld id="{E6BC612A-EF24-48E6-916B-F574F5F03627}" type="datetimeFigureOut">
               <a:rPr lang="en-US" smtClean="0"/>
-              <a:t>9/16/2021</a:t>
+              <a:t>9/17/2021</a:t>
             </a:fld>
             <a:endParaRPr lang="en-US"/>
           </a:p>
@@ -2078,7 +2079,7 @@
           <a:p>
             <a:fld id="{E6BC612A-EF24-48E6-916B-F574F5F03627}" type="datetimeFigureOut">
               <a:rPr lang="en-US" smtClean="0"/>
-              <a:t>9/16/2021</a:t>
+              <a:t>9/17/2021</a:t>
             </a:fld>
             <a:endParaRPr lang="en-US"/>
           </a:p>
@@ -2389,7 +2390,7 @@
           <a:p>
             <a:fld id="{E6BC612A-EF24-48E6-916B-F574F5F03627}" type="datetimeFigureOut">
               <a:rPr lang="en-US" smtClean="0"/>
-              <a:t>9/16/2021</a:t>
+              <a:t>9/17/2021</a:t>
             </a:fld>
             <a:endParaRPr lang="en-US"/>
           </a:p>
@@ -2677,7 +2678,7 @@
           <a:p>
             <a:fld id="{E6BC612A-EF24-48E6-916B-F574F5F03627}" type="datetimeFigureOut">
               <a:rPr lang="en-US" smtClean="0"/>
-              <a:t>9/16/2021</a:t>
+              <a:t>9/17/2021</a:t>
             </a:fld>
             <a:endParaRPr lang="en-US"/>
           </a:p>
@@ -2918,7 +2919,7 @@
           <a:p>
             <a:fld id="{E6BC612A-EF24-48E6-916B-F574F5F03627}" type="datetimeFigureOut">
               <a:rPr lang="en-US" smtClean="0"/>
-              <a:t>9/16/2021</a:t>
+              <a:t>9/17/2021</a:t>
             </a:fld>
             <a:endParaRPr lang="en-US"/>
           </a:p>
@@ -3484,6 +3485,89 @@
           <a:p>
             <a:r>
               <a:rPr lang="en-US" dirty="0"/>
+              <a:t>Plot x Overview</a:t>
+            </a:r>
+          </a:p>
+        </p:txBody>
+      </p:sp>
+      <p:sp>
+        <p:nvSpPr>
+          <p:cNvPr id="3" name="Content Placeholder 2">
+            <a:extLst>
+              <a:ext uri="{FF2B5EF4-FFF2-40B4-BE49-F238E27FC236}">
+                <a16:creationId xmlns:a16="http://schemas.microsoft.com/office/drawing/2014/main" id="{6FB8F88A-56CB-4F3D-B728-46FDDACAECF4}"/>
+              </a:ext>
+            </a:extLst>
+          </p:cNvPr>
+          <p:cNvSpPr>
+            <a:spLocks noGrp="1"/>
+          </p:cNvSpPr>
+          <p:nvPr>
+            <p:ph idx="1"/>
+          </p:nvPr>
+        </p:nvSpPr>
+        <p:spPr/>
+        <p:txBody>
+          <a:bodyPr/>
+          <a:lstStyle/>
+          <a:p>
+            <a:endParaRPr lang="en-US"/>
+          </a:p>
+        </p:txBody>
+      </p:sp>
+    </p:spTree>
+    <p:extLst>
+      <p:ext uri="{BB962C8B-B14F-4D97-AF65-F5344CB8AC3E}">
+        <p14:creationId xmlns:p14="http://schemas.microsoft.com/office/powerpoint/2010/main" val="3503280482"/>
+      </p:ext>
+    </p:extLst>
+  </p:cSld>
+  <p:clrMapOvr>
+    <a:masterClrMapping/>
+  </p:clrMapOvr>
+</p:sld>
+</file>
+
+<file path=ppt/slides/slide11.xml><?xml version="1.0" encoding="utf-8"?>
+<p:sld xmlns:a="http://schemas.openxmlformats.org/drawingml/2006/main" xmlns:r="http://schemas.openxmlformats.org/officeDocument/2006/relationships" xmlns:p="http://schemas.openxmlformats.org/presentationml/2006/main">
+  <p:cSld>
+    <p:spTree>
+      <p:nvGrpSpPr>
+        <p:cNvPr id="1" name=""/>
+        <p:cNvGrpSpPr/>
+        <p:nvPr/>
+      </p:nvGrpSpPr>
+      <p:grpSpPr>
+        <a:xfrm>
+          <a:off x="0" y="0"/>
+          <a:ext cx="0" cy="0"/>
+          <a:chOff x="0" y="0"/>
+          <a:chExt cx="0" cy="0"/>
+        </a:xfrm>
+      </p:grpSpPr>
+      <p:sp>
+        <p:nvSpPr>
+          <p:cNvPr id="2" name="Title 1">
+            <a:extLst>
+              <a:ext uri="{FF2B5EF4-FFF2-40B4-BE49-F238E27FC236}">
+                <a16:creationId xmlns:a16="http://schemas.microsoft.com/office/drawing/2014/main" id="{6B8538E0-1E6D-415A-9B97-1C50AFD5F49E}"/>
+              </a:ext>
+            </a:extLst>
+          </p:cNvPr>
+          <p:cNvSpPr>
+            <a:spLocks noGrp="1"/>
+          </p:cNvSpPr>
+          <p:nvPr>
+            <p:ph type="title"/>
+          </p:nvPr>
+        </p:nvSpPr>
+        <p:spPr/>
+        <p:txBody>
+          <a:bodyPr/>
+          <a:lstStyle/>
+          <a:p>
+            <a:r>
+              <a:rPr lang="en-US" dirty="0"/>
               <a:t>Project </a:t>
             </a:r>
             <a:r>
@@ -3572,7 +3656,7 @@
           <a:p>
             <a:r>
               <a:rPr lang="en-US" dirty="0"/>
-              <a:t>Project Overview</a:t>
+              <a:t>Initial thoughts on data</a:t>
             </a:r>
           </a:p>
         </p:txBody>
@@ -3598,14 +3682,34 @@
           <a:bodyPr/>
           <a:lstStyle/>
           <a:p>
-            <a:endParaRPr lang="en-US"/>
+            <a:r>
+              <a:rPr lang="en-US" dirty="0"/>
+              <a:t>We did not expect to be such a large correlation between median income and number of degrees earned. </a:t>
+            </a:r>
+          </a:p>
+          <a:p>
+            <a:r>
+              <a:rPr lang="en-US" dirty="0"/>
+              <a:t> No expected correlation between poverty rate and degrees earned. </a:t>
+            </a:r>
+          </a:p>
+          <a:p>
+            <a:r>
+              <a:rPr lang="en-US" dirty="0"/>
+              <a:t> As degrees earned rises, the unemployment rate </a:t>
+            </a:r>
+            <a:r>
+              <a:rPr lang="en-US"/>
+              <a:t>goes down. </a:t>
+            </a:r>
+            <a:endParaRPr lang="en-US" dirty="0"/>
           </a:p>
         </p:txBody>
       </p:sp>
     </p:spTree>
     <p:extLst>
       <p:ext uri="{BB962C8B-B14F-4D97-AF65-F5344CB8AC3E}">
-        <p14:creationId xmlns:p14="http://schemas.microsoft.com/office/powerpoint/2010/main" val="4072212800"/>
+        <p14:creationId xmlns:p14="http://schemas.microsoft.com/office/powerpoint/2010/main" val="1386560844"/>
       </p:ext>
     </p:extLst>
   </p:cSld>
@@ -3655,7 +3759,7 @@
           <a:p>
             <a:r>
               <a:rPr lang="en-US" dirty="0"/>
-              <a:t>Data Overview</a:t>
+              <a:t>Project Overview</a:t>
             </a:r>
           </a:p>
         </p:txBody>
@@ -3688,7 +3792,7 @@
     </p:spTree>
     <p:extLst>
       <p:ext uri="{BB962C8B-B14F-4D97-AF65-F5344CB8AC3E}">
-        <p14:creationId xmlns:p14="http://schemas.microsoft.com/office/powerpoint/2010/main" val="2015519189"/>
+        <p14:creationId xmlns:p14="http://schemas.microsoft.com/office/powerpoint/2010/main" val="4072212800"/>
       </p:ext>
     </p:extLst>
   </p:cSld>
@@ -3738,7 +3842,7 @@
           <a:p>
             <a:r>
               <a:rPr lang="en-US" dirty="0"/>
-              <a:t>Data Clean Overview</a:t>
+              <a:t>Data Overview</a:t>
             </a:r>
           </a:p>
         </p:txBody>
@@ -3771,7 +3875,7 @@
     </p:spTree>
     <p:extLst>
       <p:ext uri="{BB962C8B-B14F-4D97-AF65-F5344CB8AC3E}">
-        <p14:creationId xmlns:p14="http://schemas.microsoft.com/office/powerpoint/2010/main" val="590225578"/>
+        <p14:creationId xmlns:p14="http://schemas.microsoft.com/office/powerpoint/2010/main" val="2015519189"/>
       </p:ext>
     </p:extLst>
   </p:cSld>
@@ -3821,7 +3925,7 @@
           <a:p>
             <a:r>
               <a:rPr lang="en-US" dirty="0"/>
-              <a:t>Plot x Overview</a:t>
+              <a:t>Data Clean Overview</a:t>
             </a:r>
           </a:p>
         </p:txBody>
@@ -3854,7 +3958,7 @@
     </p:spTree>
     <p:extLst>
       <p:ext uri="{BB962C8B-B14F-4D97-AF65-F5344CB8AC3E}">
-        <p14:creationId xmlns:p14="http://schemas.microsoft.com/office/powerpoint/2010/main" val="826298702"/>
+        <p14:creationId xmlns:p14="http://schemas.microsoft.com/office/powerpoint/2010/main" val="590225578"/>
       </p:ext>
     </p:extLst>
   </p:cSld>
@@ -3937,7 +4041,7 @@
     </p:spTree>
     <p:extLst>
       <p:ext uri="{BB962C8B-B14F-4D97-AF65-F5344CB8AC3E}">
-        <p14:creationId xmlns:p14="http://schemas.microsoft.com/office/powerpoint/2010/main" val="1069150166"/>
+        <p14:creationId xmlns:p14="http://schemas.microsoft.com/office/powerpoint/2010/main" val="826298702"/>
       </p:ext>
     </p:extLst>
   </p:cSld>
@@ -4020,7 +4124,7 @@
     </p:spTree>
     <p:extLst>
       <p:ext uri="{BB962C8B-B14F-4D97-AF65-F5344CB8AC3E}">
-        <p14:creationId xmlns:p14="http://schemas.microsoft.com/office/powerpoint/2010/main" val="2417900011"/>
+        <p14:creationId xmlns:p14="http://schemas.microsoft.com/office/powerpoint/2010/main" val="1069150166"/>
       </p:ext>
     </p:extLst>
   </p:cSld>
@@ -4103,7 +4207,7 @@
     </p:spTree>
     <p:extLst>
       <p:ext uri="{BB962C8B-B14F-4D97-AF65-F5344CB8AC3E}">
-        <p14:creationId xmlns:p14="http://schemas.microsoft.com/office/powerpoint/2010/main" val="2557668454"/>
+        <p14:creationId xmlns:p14="http://schemas.microsoft.com/office/powerpoint/2010/main" val="2417900011"/>
       </p:ext>
     </p:extLst>
   </p:cSld>
@@ -4186,7 +4290,7 @@
     </p:spTree>
     <p:extLst>
       <p:ext uri="{BB962C8B-B14F-4D97-AF65-F5344CB8AC3E}">
-        <p14:creationId xmlns:p14="http://schemas.microsoft.com/office/powerpoint/2010/main" val="3503280482"/>
+        <p14:creationId xmlns:p14="http://schemas.microsoft.com/office/powerpoint/2010/main" val="2557668454"/>
       </p:ext>
     </p:extLst>
   </p:cSld>

</xml_diff>